<commit_message>
Finished poster for printing
</commit_message>
<xml_diff>
--- a/Administration Documents/Poster Template/Feathergraphics/PowerPoint Diagrams/FlaskDiagram.pptx
+++ b/Administration Documents/Poster Template/Feathergraphics/PowerPoint Diagrams/FlaskDiagram.pptx
@@ -3699,8 +3699,8 @@
         </p:nvCxnSpPr>
         <p:spPr>
           <a:xfrm>
-            <a:off x="2702105" y="833534"/>
-            <a:ext cx="974758" cy="588581"/>
+            <a:off x="2921104" y="872577"/>
+            <a:ext cx="755759" cy="549538"/>
           </a:xfrm>
           <a:prstGeom prst="straightConnector1">
             <a:avLst/>
@@ -3911,7 +3911,7 @@
         </p:blipFill>
         <p:spPr>
           <a:xfrm>
-            <a:off x="7859738" y="1986461"/>
+            <a:off x="69868" y="2005483"/>
             <a:ext cx="2468563" cy="2115532"/>
           </a:xfrm>
           <a:prstGeom prst="rect">
@@ -3930,15 +3930,15 @@
           </p:cNvPr>
           <p:cNvCxnSpPr>
             <a:cxnSpLocks/>
-            <a:stCxn id="9" idx="3"/>
-            <a:endCxn id="31" idx="1"/>
+            <a:stCxn id="9" idx="1"/>
+            <a:endCxn id="31" idx="3"/>
           </p:cNvCxnSpPr>
           <p:nvPr/>
         </p:nvCxnSpPr>
         <p:spPr>
-          <a:xfrm flipV="1">
-            <a:off x="5887093" y="3044227"/>
-            <a:ext cx="1972645" cy="19023"/>
+          <a:xfrm flipH="1" flipV="1">
+            <a:off x="2538431" y="3063249"/>
+            <a:ext cx="1138432" cy="1"/>
           </a:xfrm>
           <a:prstGeom prst="straightConnector1">
             <a:avLst/>
@@ -4001,7 +4001,7 @@
         </p:nvSpPr>
         <p:spPr>
           <a:xfrm>
-            <a:off x="491875" y="5982290"/>
+            <a:off x="3676862" y="5982290"/>
             <a:ext cx="2210230" cy="875710"/>
           </a:xfrm>
           <a:prstGeom prst="rect">
@@ -4050,7 +4050,7 @@
         </p:nvSpPr>
         <p:spPr>
           <a:xfrm>
-            <a:off x="491875" y="4268589"/>
+            <a:off x="705680" y="4871539"/>
             <a:ext cx="2210230" cy="875710"/>
           </a:xfrm>
           <a:prstGeom prst="rect">
@@ -4100,10 +4100,10 @@
       </p:sp>
       <p:sp>
         <p:nvSpPr>
-          <p:cNvPr id="48" name="Rectangle 47">
-            <a:extLst>
-              <a:ext uri="{FF2B5EF4-FFF2-40B4-BE49-F238E27FC236}">
-                <a16:creationId xmlns:a16="http://schemas.microsoft.com/office/drawing/2014/main" id="{C0D127A1-F02F-444F-B33D-4B0216894831}"/>
+          <p:cNvPr id="49" name="Rectangle 48">
+            <a:extLst>
+              <a:ext uri="{FF2B5EF4-FFF2-40B4-BE49-F238E27FC236}">
+                <a16:creationId xmlns:a16="http://schemas.microsoft.com/office/drawing/2014/main" id="{86F06947-25A1-4B8C-9071-696228AEBA1D}"/>
               </a:ext>
             </a:extLst>
           </p:cNvPr>
@@ -4112,8 +4112,8 @@
         </p:nvSpPr>
         <p:spPr>
           <a:xfrm>
-            <a:off x="491875" y="1548606"/>
-            <a:ext cx="2210230" cy="875710"/>
+            <a:off x="710874" y="307505"/>
+            <a:ext cx="2210230" cy="1130143"/>
           </a:xfrm>
           <a:prstGeom prst="rect">
             <a:avLst/>
@@ -4140,7 +4140,7 @@
           <a:p>
             <a:r>
               <a:rPr lang="en-ZA" sz="2400" dirty="0"/>
-              <a:t>Style files </a:t>
+              <a:t>Template files </a:t>
             </a:r>
           </a:p>
           <a:p>
@@ -4154,69 +4154,7 @@
             </a:r>
             <a:r>
               <a:rPr lang="en-ZA" dirty="0"/>
-              <a:t> Dygraphs.css)</a:t>
-            </a:r>
-            <a:endParaRPr lang="en-ZA" sz="2400" dirty="0"/>
-          </a:p>
-        </p:txBody>
-      </p:sp>
-      <p:sp>
-        <p:nvSpPr>
-          <p:cNvPr id="49" name="Rectangle 48">
-            <a:extLst>
-              <a:ext uri="{FF2B5EF4-FFF2-40B4-BE49-F238E27FC236}">
-                <a16:creationId xmlns:a16="http://schemas.microsoft.com/office/drawing/2014/main" id="{86F06947-25A1-4B8C-9071-696228AEBA1D}"/>
-              </a:ext>
-            </a:extLst>
-          </p:cNvPr>
-          <p:cNvSpPr/>
-          <p:nvPr/>
-        </p:nvSpPr>
-        <p:spPr>
-          <a:xfrm>
-            <a:off x="491875" y="395679"/>
-            <a:ext cx="2210230" cy="875710"/>
-          </a:xfrm>
-          <a:prstGeom prst="rect">
-            <a:avLst/>
-          </a:prstGeom>
-          <a:ln/>
-        </p:spPr>
-        <p:style>
-          <a:lnRef idx="0">
-            <a:schemeClr val="accent3"/>
-          </a:lnRef>
-          <a:fillRef idx="3">
-            <a:schemeClr val="accent3"/>
-          </a:fillRef>
-          <a:effectRef idx="3">
-            <a:schemeClr val="accent3"/>
-          </a:effectRef>
-          <a:fontRef idx="minor">
-            <a:schemeClr val="lt1"/>
-          </a:fontRef>
-        </p:style>
-        <p:txBody>
-          <a:bodyPr vert="horz" rtlCol="0" anchor="ctr"/>
-          <a:lstStyle/>
-          <a:p>
-            <a:r>
-              <a:rPr lang="en-ZA" sz="2400" dirty="0"/>
-              <a:t>Template files </a:t>
-            </a:r>
-          </a:p>
-          <a:p>
-            <a:r>
-              <a:rPr lang="en-ZA" dirty="0"/>
-              <a:t>(</a:t>
-            </a:r>
-            <a:r>
-              <a:rPr lang="en-ZA" dirty="0" err="1"/>
-              <a:t>Eg.</a:t>
-            </a:r>
-            <a:r>
-              <a:rPr lang="en-ZA" dirty="0"/>
-              <a:t> index.html)</a:t>
+              <a:t> index.html and dygraphs.css)</a:t>
             </a:r>
             <a:endParaRPr lang="en-ZA" sz="2400" dirty="0"/>
           </a:p>
@@ -4224,22 +4162,24 @@
       </p:sp>
       <p:cxnSp>
         <p:nvCxnSpPr>
-          <p:cNvPr id="51" name="Straight Arrow Connector 50">
-            <a:extLst>
-              <a:ext uri="{FF2B5EF4-FFF2-40B4-BE49-F238E27FC236}">
-                <a16:creationId xmlns:a16="http://schemas.microsoft.com/office/drawing/2014/main" id="{9729BAA4-F3F5-4DE3-A12C-019287955ADE}"/>
+          <p:cNvPr id="62" name="Straight Arrow Connector 61">
+            <a:extLst>
+              <a:ext uri="{FF2B5EF4-FFF2-40B4-BE49-F238E27FC236}">
+                <a16:creationId xmlns:a16="http://schemas.microsoft.com/office/drawing/2014/main" id="{DD0E9383-2131-4CC5-B871-7CE5A72F83BC}"/>
               </a:ext>
             </a:extLst>
           </p:cNvPr>
           <p:cNvCxnSpPr>
             <a:cxnSpLocks/>
+            <a:stCxn id="47" idx="3"/>
+            <a:endCxn id="18" idx="1"/>
           </p:cNvCxnSpPr>
           <p:nvPr/>
         </p:nvCxnSpPr>
         <p:spPr>
-          <a:xfrm>
-            <a:off x="1320213" y="5144299"/>
-            <a:ext cx="0" cy="837991"/>
+          <a:xfrm flipV="1">
+            <a:off x="2915910" y="4706444"/>
+            <a:ext cx="760953" cy="602950"/>
           </a:xfrm>
           <a:prstGeom prst="straightConnector1">
             <a:avLst/>
@@ -4288,208 +4228,6 @@
           </a:fontRef>
         </p:style>
       </p:cxnSp>
-      <p:cxnSp>
-        <p:nvCxnSpPr>
-          <p:cNvPr id="52" name="Straight Arrow Connector 51">
-            <a:extLst>
-              <a:ext uri="{FF2B5EF4-FFF2-40B4-BE49-F238E27FC236}">
-                <a16:creationId xmlns:a16="http://schemas.microsoft.com/office/drawing/2014/main" id="{DE3FE59A-1BF3-4F17-B376-E4C88A72D39C}"/>
-              </a:ext>
-            </a:extLst>
-          </p:cNvPr>
-          <p:cNvCxnSpPr>
-            <a:cxnSpLocks/>
-          </p:cNvCxnSpPr>
-          <p:nvPr/>
-        </p:nvCxnSpPr>
-        <p:spPr>
-          <a:xfrm flipV="1">
-            <a:off x="1868161" y="5144299"/>
-            <a:ext cx="0" cy="837991"/>
-          </a:xfrm>
-          <a:prstGeom prst="straightConnector1">
-            <a:avLst/>
-          </a:prstGeom>
-          <a:ln w="25400">
-            <a:solidFill>
-              <a:schemeClr val="tx1"/>
-            </a:solidFill>
-            <a:headEnd type="none" w="lg" len="lg"/>
-            <a:tailEnd type="triangle" w="lg" len="lg"/>
-          </a:ln>
-          <a:effectLst>
-            <a:outerShdw blurRad="50800" dist="38100" algn="l" rotWithShape="0">
-              <a:prstClr val="black">
-                <a:alpha val="40000"/>
-              </a:prstClr>
-            </a:outerShdw>
-          </a:effectLst>
-          <a:scene3d>
-            <a:camera prst="orthographicFront"/>
-            <a:lightRig rig="threePt" dir="t"/>
-          </a:scene3d>
-          <a:sp3d>
-            <a:bevelT w="0"/>
-            <a:bevelB w="0"/>
-          </a:sp3d>
-        </p:spPr>
-        <p:style>
-          <a:lnRef idx="1">
-            <a:schemeClr val="accent1">
-              <a:lumMod val="67000"/>
-            </a:schemeClr>
-          </a:lnRef>
-          <a:fillRef idx="0">
-            <a:schemeClr val="accent1">
-              <a:lumMod val="67000"/>
-            </a:schemeClr>
-          </a:fillRef>
-          <a:effectRef idx="0">
-            <a:schemeClr val="accent1">
-              <a:lumMod val="67000"/>
-            </a:schemeClr>
-          </a:effectRef>
-          <a:fontRef idx="minor">
-            <a:schemeClr val="tx1"/>
-          </a:fontRef>
-        </p:style>
-      </p:cxnSp>
-      <p:cxnSp>
-        <p:nvCxnSpPr>
-          <p:cNvPr id="59" name="Straight Arrow Connector 58">
-            <a:extLst>
-              <a:ext uri="{FF2B5EF4-FFF2-40B4-BE49-F238E27FC236}">
-                <a16:creationId xmlns:a16="http://schemas.microsoft.com/office/drawing/2014/main" id="{E3999155-6B62-407C-9BE3-5BCB1467323A}"/>
-              </a:ext>
-            </a:extLst>
-          </p:cNvPr>
-          <p:cNvCxnSpPr>
-            <a:cxnSpLocks/>
-            <a:stCxn id="48" idx="3"/>
-            <a:endCxn id="17" idx="1"/>
-          </p:cNvCxnSpPr>
-          <p:nvPr/>
-        </p:nvCxnSpPr>
-        <p:spPr>
-          <a:xfrm flipV="1">
-            <a:off x="2702105" y="1422115"/>
-            <a:ext cx="974758" cy="564346"/>
-          </a:xfrm>
-          <a:prstGeom prst="straightConnector1">
-            <a:avLst/>
-          </a:prstGeom>
-          <a:ln w="25400">
-            <a:solidFill>
-              <a:schemeClr val="tx1"/>
-            </a:solidFill>
-            <a:headEnd type="none" w="lg" len="lg"/>
-            <a:tailEnd type="triangle" w="lg" len="lg"/>
-          </a:ln>
-          <a:effectLst>
-            <a:outerShdw blurRad="50800" dist="38100" algn="l" rotWithShape="0">
-              <a:prstClr val="black">
-                <a:alpha val="40000"/>
-              </a:prstClr>
-            </a:outerShdw>
-          </a:effectLst>
-          <a:scene3d>
-            <a:camera prst="orthographicFront"/>
-            <a:lightRig rig="threePt" dir="t"/>
-          </a:scene3d>
-          <a:sp3d>
-            <a:bevelT w="0"/>
-            <a:bevelB w="0"/>
-          </a:sp3d>
-        </p:spPr>
-        <p:style>
-          <a:lnRef idx="1">
-            <a:schemeClr val="accent1">
-              <a:lumMod val="67000"/>
-            </a:schemeClr>
-          </a:lnRef>
-          <a:fillRef idx="0">
-            <a:schemeClr val="accent1">
-              <a:lumMod val="67000"/>
-            </a:schemeClr>
-          </a:fillRef>
-          <a:effectRef idx="0">
-            <a:schemeClr val="accent1">
-              <a:lumMod val="67000"/>
-            </a:schemeClr>
-          </a:effectRef>
-          <a:fontRef idx="minor">
-            <a:schemeClr val="tx1"/>
-          </a:fontRef>
-        </p:style>
-      </p:cxnSp>
-      <p:cxnSp>
-        <p:nvCxnSpPr>
-          <p:cNvPr id="62" name="Straight Arrow Connector 61">
-            <a:extLst>
-              <a:ext uri="{FF2B5EF4-FFF2-40B4-BE49-F238E27FC236}">
-                <a16:creationId xmlns:a16="http://schemas.microsoft.com/office/drawing/2014/main" id="{DD0E9383-2131-4CC5-B871-7CE5A72F83BC}"/>
-              </a:ext>
-            </a:extLst>
-          </p:cNvPr>
-          <p:cNvCxnSpPr>
-            <a:cxnSpLocks/>
-            <a:stCxn id="47" idx="3"/>
-            <a:endCxn id="18" idx="1"/>
-          </p:cNvCxnSpPr>
-          <p:nvPr/>
-        </p:nvCxnSpPr>
-        <p:spPr>
-          <a:xfrm>
-            <a:off x="2702105" y="4706444"/>
-            <a:ext cx="974758" cy="0"/>
-          </a:xfrm>
-          <a:prstGeom prst="straightConnector1">
-            <a:avLst/>
-          </a:prstGeom>
-          <a:ln w="25400">
-            <a:solidFill>
-              <a:schemeClr val="tx1"/>
-            </a:solidFill>
-            <a:headEnd type="none" w="lg" len="lg"/>
-            <a:tailEnd type="triangle" w="lg" len="lg"/>
-          </a:ln>
-          <a:effectLst>
-            <a:outerShdw blurRad="50800" dist="38100" algn="l" rotWithShape="0">
-              <a:prstClr val="black">
-                <a:alpha val="40000"/>
-              </a:prstClr>
-            </a:outerShdw>
-          </a:effectLst>
-          <a:scene3d>
-            <a:camera prst="orthographicFront"/>
-            <a:lightRig rig="threePt" dir="t"/>
-          </a:scene3d>
-          <a:sp3d>
-            <a:bevelT w="0"/>
-            <a:bevelB w="0"/>
-          </a:sp3d>
-        </p:spPr>
-        <p:style>
-          <a:lnRef idx="1">
-            <a:schemeClr val="accent1">
-              <a:lumMod val="67000"/>
-            </a:schemeClr>
-          </a:lnRef>
-          <a:fillRef idx="0">
-            <a:schemeClr val="accent1">
-              <a:lumMod val="67000"/>
-            </a:schemeClr>
-          </a:fillRef>
-          <a:effectRef idx="0">
-            <a:schemeClr val="accent1">
-              <a:lumMod val="67000"/>
-            </a:schemeClr>
-          </a:effectRef>
-          <a:fontRef idx="minor">
-            <a:schemeClr val="tx1"/>
-          </a:fontRef>
-        </p:style>
-      </p:cxnSp>
       <p:sp>
         <p:nvSpPr>
           <p:cNvPr id="61" name="TextBox 60">
@@ -4504,7 +4242,7 @@
         </p:nvSpPr>
         <p:spPr>
           <a:xfrm>
-            <a:off x="539841" y="5378628"/>
+            <a:off x="1826804" y="6371168"/>
             <a:ext cx="862565" cy="369332"/>
           </a:xfrm>
           <a:prstGeom prst="rect">
@@ -4574,8 +4312,8 @@
         </p:nvSpPr>
         <p:spPr>
           <a:xfrm>
-            <a:off x="5965414" y="2740084"/>
-            <a:ext cx="1813208" cy="800219"/>
+            <a:off x="2633414" y="2739065"/>
+            <a:ext cx="1105112" cy="1015663"/>
           </a:xfrm>
           <a:prstGeom prst="rect">
             <a:avLst/>
@@ -4653,8 +4391,8 @@
         </p:nvSpPr>
         <p:spPr>
           <a:xfrm>
-            <a:off x="1904810" y="5243887"/>
-            <a:ext cx="1126066" cy="646331"/>
+            <a:off x="1571823" y="5844192"/>
+            <a:ext cx="2153753" cy="369332"/>
           </a:xfrm>
           <a:prstGeom prst="rect">
             <a:avLst/>
@@ -4723,8 +4461,8 @@
         </p:nvSpPr>
         <p:spPr>
           <a:xfrm>
-            <a:off x="491875" y="5309394"/>
-            <a:ext cx="2477352" cy="526327"/>
+            <a:off x="1118746" y="5844192"/>
+            <a:ext cx="2064286" cy="853145"/>
           </a:xfrm>
           <a:prstGeom prst="roundRect">
             <a:avLst/>
@@ -4776,7 +4514,7 @@
         </p:nvSpPr>
         <p:spPr>
           <a:xfrm>
-            <a:off x="3030876" y="5249391"/>
+            <a:off x="65875" y="5972557"/>
             <a:ext cx="1047963" cy="646331"/>
           </a:xfrm>
           <a:prstGeom prst="rect">
@@ -4815,8 +4553,8 @@
         </p:nvSpPr>
         <p:spPr>
           <a:xfrm>
-            <a:off x="2773201" y="4331608"/>
-            <a:ext cx="862565" cy="369332"/>
+            <a:off x="2947859" y="4331608"/>
+            <a:ext cx="711247" cy="369309"/>
           </a:xfrm>
           <a:prstGeom prst="rect">
             <a:avLst/>
@@ -4850,7 +4588,7 @@
         </p:nvSpPr>
         <p:spPr>
           <a:xfrm>
-            <a:off x="2690990" y="1199352"/>
+            <a:off x="3038225" y="616894"/>
             <a:ext cx="862565" cy="369332"/>
           </a:xfrm>
           <a:prstGeom prst="rect">
@@ -4871,6 +4609,113 @@
           </a:p>
         </p:txBody>
       </p:sp>
+      <p:cxnSp>
+        <p:nvCxnSpPr>
+          <p:cNvPr id="24" name="Connector: Elbow 23">
+            <a:extLst>
+              <a:ext uri="{FF2B5EF4-FFF2-40B4-BE49-F238E27FC236}">
+                <a16:creationId xmlns:a16="http://schemas.microsoft.com/office/drawing/2014/main" id="{55B12F0C-451E-417A-BF89-10A83B21266D}"/>
+              </a:ext>
+            </a:extLst>
+          </p:cNvPr>
+          <p:cNvCxnSpPr>
+            <a:cxnSpLocks/>
+            <a:endCxn id="46" idx="1"/>
+          </p:cNvCxnSpPr>
+          <p:nvPr/>
+        </p:nvCxnSpPr>
+        <p:spPr>
+          <a:xfrm>
+            <a:off x="1270594" y="5747249"/>
+            <a:ext cx="2406268" cy="672896"/>
+          </a:xfrm>
+          <a:prstGeom prst="bentConnector3">
+            <a:avLst>
+              <a:gd name="adj1" fmla="val 324"/>
+            </a:avLst>
+          </a:prstGeom>
+          <a:ln w="25400">
+            <a:solidFill>
+              <a:schemeClr val="tx1"/>
+            </a:solidFill>
+            <a:tailEnd type="triangle" w="lg" len="lg"/>
+          </a:ln>
+          <a:effectLst>
+            <a:outerShdw blurRad="50800" dist="38100" algn="l" rotWithShape="0">
+              <a:prstClr val="black">
+                <a:alpha val="40000"/>
+              </a:prstClr>
+            </a:outerShdw>
+          </a:effectLst>
+        </p:spPr>
+        <p:style>
+          <a:lnRef idx="1">
+            <a:schemeClr val="accent1"/>
+          </a:lnRef>
+          <a:fillRef idx="0">
+            <a:schemeClr val="accent1"/>
+          </a:fillRef>
+          <a:effectRef idx="0">
+            <a:schemeClr val="accent1"/>
+          </a:effectRef>
+          <a:fontRef idx="minor">
+            <a:schemeClr val="tx1"/>
+          </a:fontRef>
+        </p:style>
+      </p:cxnSp>
+      <p:cxnSp>
+        <p:nvCxnSpPr>
+          <p:cNvPr id="53" name="Connector: Elbow 52">
+            <a:extLst>
+              <a:ext uri="{FF2B5EF4-FFF2-40B4-BE49-F238E27FC236}">
+                <a16:creationId xmlns:a16="http://schemas.microsoft.com/office/drawing/2014/main" id="{8710A4B5-42A3-4603-894A-8AF2E815B553}"/>
+              </a:ext>
+            </a:extLst>
+          </p:cNvPr>
+          <p:cNvCxnSpPr>
+            <a:cxnSpLocks/>
+          </p:cNvCxnSpPr>
+          <p:nvPr/>
+        </p:nvCxnSpPr>
+        <p:spPr>
+          <a:xfrm>
+            <a:off x="1542361" y="5747249"/>
+            <a:ext cx="2116745" cy="471779"/>
+          </a:xfrm>
+          <a:prstGeom prst="bentConnector3">
+            <a:avLst>
+              <a:gd name="adj1" fmla="val 1077"/>
+            </a:avLst>
+          </a:prstGeom>
+          <a:ln w="25400">
+            <a:solidFill>
+              <a:schemeClr val="tx1"/>
+            </a:solidFill>
+            <a:tailEnd type="triangle" w="lg" len="lg"/>
+          </a:ln>
+          <a:effectLst>
+            <a:outerShdw blurRad="50800" dist="38100" algn="l" rotWithShape="0">
+              <a:prstClr val="black">
+                <a:alpha val="40000"/>
+              </a:prstClr>
+            </a:outerShdw>
+          </a:effectLst>
+        </p:spPr>
+        <p:style>
+          <a:lnRef idx="1">
+            <a:schemeClr val="accent1"/>
+          </a:lnRef>
+          <a:fillRef idx="0">
+            <a:schemeClr val="accent1"/>
+          </a:fillRef>
+          <a:effectRef idx="0">
+            <a:schemeClr val="accent1"/>
+          </a:effectRef>
+          <a:fontRef idx="minor">
+            <a:schemeClr val="tx1"/>
+          </a:fontRef>
+        </p:style>
+      </p:cxnSp>
     </p:spTree>
     <p:extLst>
       <p:ext uri="{BB962C8B-B14F-4D97-AF65-F5344CB8AC3E}">

</xml_diff>